<commit_message>
AO2, atividade encontro remoto 2 e encontro remoto 3
</commit_message>
<xml_diff>
--- a/ER1/DOCUMENTAÇÃO DE TESTE.pptx
+++ b/ER1/DOCUMENTAÇÃO DE TESTE.pptx
@@ -5,10 +5,10 @@
     <p:sldMasterId id="2147483648" r:id="rId1"/>
   </p:sldMasterIdLst>
   <p:notesMasterIdLst>
-    <p:notesMasterId r:id="rId9"/>
+    <p:notesMasterId r:id="rId8"/>
   </p:notesMasterIdLst>
   <p:handoutMasterIdLst>
-    <p:handoutMasterId r:id="rId10"/>
+    <p:handoutMasterId r:id="rId9"/>
   </p:handoutMasterIdLst>
   <p:sldIdLst>
     <p:sldId id="375" r:id="rId2"/>
@@ -17,7 +17,6 @@
     <p:sldId id="408" r:id="rId5"/>
     <p:sldId id="409" r:id="rId6"/>
     <p:sldId id="304" r:id="rId7"/>
-    <p:sldId id="410" r:id="rId8"/>
   </p:sldIdLst>
   <p:sldSz cx="12192000" cy="6858000"/>
   <p:notesSz cx="6858000" cy="9144000"/>
@@ -1166,90 +1165,6 @@
     <p:extLst>
       <p:ext uri="{BB962C8B-B14F-4D97-AF65-F5344CB8AC3E}">
         <p14:creationId xmlns:p14="http://schemas.microsoft.com/office/powerpoint/2010/main" val="3163871570"/>
-      </p:ext>
-    </p:extLst>
-  </p:cSld>
-  <p:clrMapOvr>
-    <a:masterClrMapping/>
-  </p:clrMapOvr>
-</p:notes>
-</file>
-
-<file path=ppt/notesSlides/notesSlide7.xml><?xml version="1.0" encoding="utf-8"?>
-<p:notes xmlns:a="http://schemas.openxmlformats.org/drawingml/2006/main" xmlns:r="http://schemas.openxmlformats.org/officeDocument/2006/relationships" xmlns:p="http://schemas.openxmlformats.org/presentationml/2006/main">
-  <p:cSld>
-    <p:spTree>
-      <p:nvGrpSpPr>
-        <p:cNvPr id="1" name=""/>
-        <p:cNvGrpSpPr/>
-        <p:nvPr/>
-      </p:nvGrpSpPr>
-      <p:grpSpPr>
-        <a:xfrm>
-          <a:off x="0" y="0"/>
-          <a:ext cx="0" cy="0"/>
-          <a:chOff x="0" y="0"/>
-          <a:chExt cx="0" cy="0"/>
-        </a:xfrm>
-      </p:grpSpPr>
-      <p:sp>
-        <p:nvSpPr>
-          <p:cNvPr id="2" name="Espaço Reservado para Imagem de Slide 1"/>
-          <p:cNvSpPr>
-            <a:spLocks noGrp="1" noRot="1" noChangeAspect="1"/>
-          </p:cNvSpPr>
-          <p:nvPr>
-            <p:ph type="sldImg"/>
-          </p:nvPr>
-        </p:nvSpPr>
-        <p:spPr/>
-      </p:sp>
-      <p:sp>
-        <p:nvSpPr>
-          <p:cNvPr id="3" name="Espaço Reservado para Anotações 2"/>
-          <p:cNvSpPr>
-            <a:spLocks noGrp="1"/>
-          </p:cNvSpPr>
-          <p:nvPr>
-            <p:ph type="body" idx="1"/>
-          </p:nvPr>
-        </p:nvSpPr>
-        <p:spPr/>
-        <p:txBody>
-          <a:bodyPr/>
-          <a:lstStyle/>
-          <a:p>
-            <a:endParaRPr lang="pt-BR"/>
-          </a:p>
-        </p:txBody>
-      </p:sp>
-      <p:sp>
-        <p:nvSpPr>
-          <p:cNvPr id="4" name="Espaço Reservado para Número de Slide 3"/>
-          <p:cNvSpPr>
-            <a:spLocks noGrp="1"/>
-          </p:cNvSpPr>
-          <p:nvPr>
-            <p:ph type="sldNum" sz="quarter" idx="5"/>
-          </p:nvPr>
-        </p:nvSpPr>
-        <p:spPr/>
-        <p:txBody>
-          <a:bodyPr/>
-          <a:lstStyle/>
-          <a:p>
-            <a:fld id="{8DF5438F-2890-46B9-BD8A-C9EE91F876FC}" type="slidenum">
-              <a:rPr lang="pt-BR" smtClean="0"/>
-              <a:t>7</a:t>
-            </a:fld>
-            <a:endParaRPr lang="pt-BR"/>
-          </a:p>
-        </p:txBody>
-      </p:sp>
-    </p:spTree>
-    <p:extLst>
-      <p:ext uri="{BB962C8B-B14F-4D97-AF65-F5344CB8AC3E}">
-        <p14:creationId xmlns:p14="http://schemas.microsoft.com/office/powerpoint/2010/main" val="3441536384"/>
       </p:ext>
     </p:extLst>
   </p:cSld>
@@ -24308,863 +24223,6 @@
     <p:extLst>
       <p:ext uri="{BB962C8B-B14F-4D97-AF65-F5344CB8AC3E}">
         <p14:creationId xmlns:p14="http://schemas.microsoft.com/office/powerpoint/2010/main" val="1098878064"/>
-      </p:ext>
-    </p:extLst>
-  </p:cSld>
-  <p:clrMapOvr>
-    <a:masterClrMapping/>
-  </p:clrMapOvr>
-</p:sld>
-</file>
-
-<file path=ppt/slides/slide7.xml><?xml version="1.0" encoding="utf-8"?>
-<p:sld xmlns:a="http://schemas.openxmlformats.org/drawingml/2006/main" xmlns:r="http://schemas.openxmlformats.org/officeDocument/2006/relationships" xmlns:p="http://schemas.openxmlformats.org/presentationml/2006/main">
-  <p:cSld>
-    <p:spTree>
-      <p:nvGrpSpPr>
-        <p:cNvPr id="1" name=""/>
-        <p:cNvGrpSpPr/>
-        <p:nvPr/>
-      </p:nvGrpSpPr>
-      <p:grpSpPr>
-        <a:xfrm>
-          <a:off x="0" y="0"/>
-          <a:ext cx="0" cy="0"/>
-          <a:chOff x="0" y="0"/>
-          <a:chExt cx="0" cy="0"/>
-        </a:xfrm>
-      </p:grpSpPr>
-      <p:sp>
-        <p:nvSpPr>
-          <p:cNvPr id="3" name="Título 2">
-            <a:extLst>
-              <a:ext uri="{FF2B5EF4-FFF2-40B4-BE49-F238E27FC236}">
-                <a16:creationId xmlns:a16="http://schemas.microsoft.com/office/drawing/2014/main" id="{12B178B4-CDED-454C-BED2-2E2B10ADA703}"/>
-              </a:ext>
-            </a:extLst>
-          </p:cNvPr>
-          <p:cNvSpPr>
-            <a:spLocks noGrp="1"/>
-          </p:cNvSpPr>
-          <p:nvPr>
-            <p:ph type="ctrTitle"/>
-          </p:nvPr>
-        </p:nvSpPr>
-        <p:spPr/>
-        <p:txBody>
-          <a:bodyPr rtlCol="0"/>
-          <a:lstStyle/>
-          <a:p>
-            <a:pPr rtl="0"/>
-            <a:r>
-              <a:rPr lang="pt-BR" dirty="0"/>
-              <a:t>responsável</a:t>
-            </a:r>
-          </a:p>
-        </p:txBody>
-      </p:sp>
-      <p:pic>
-        <p:nvPicPr>
-          <p:cNvPr id="82" name="Espaço Reservado para Imagem 81" descr="ícone&#10;">
-            <a:extLst>
-              <a:ext uri="{FF2B5EF4-FFF2-40B4-BE49-F238E27FC236}">
-                <a16:creationId xmlns:a16="http://schemas.microsoft.com/office/drawing/2014/main" id="{BB002EF1-9F25-2D40-B395-99B429C0B9E5}"/>
-              </a:ext>
-              <a:ext uri="{C183D7F6-B498-43B3-948B-1728B52AA6E4}">
-                <adec:decorative xmlns:adec="http://schemas.microsoft.com/office/drawing/2017/decorative" val="1"/>
-              </a:ext>
-            </a:extLst>
-          </p:cNvPr>
-          <p:cNvPicPr>
-            <a:picLocks noGrp="1" noChangeAspect="1"/>
-          </p:cNvPicPr>
-          <p:nvPr>
-            <p:ph type="pic" sz="quarter" idx="13"/>
-          </p:nvPr>
-        </p:nvPicPr>
-        <p:blipFill>
-          <a:blip r:embed="rId3" cstate="screen">
-            <a:extLst>
-              <a:ext uri="{28A0092B-C50C-407E-A947-70E740481C1C}">
-                <a14:useLocalDpi xmlns:a14="http://schemas.microsoft.com/office/drawing/2010/main"/>
-              </a:ext>
-              <a:ext uri="{96DAC541-7B7A-43D3-8B79-37D633B846F1}">
-                <asvg:svgBlip xmlns:asvg="http://schemas.microsoft.com/office/drawing/2016/SVG/main" r:embed="rId4"/>
-              </a:ext>
-            </a:extLst>
-          </a:blip>
-          <a:srcRect/>
-          <a:stretch>
-            <a:fillRect/>
-          </a:stretch>
-        </p:blipFill>
-        <p:spPr/>
-      </p:pic>
-      <p:pic>
-        <p:nvPicPr>
-          <p:cNvPr id="84" name="Espaço Reservado para Imagem 83" descr="ícone&#10;">
-            <a:extLst>
-              <a:ext uri="{FF2B5EF4-FFF2-40B4-BE49-F238E27FC236}">
-                <a16:creationId xmlns:a16="http://schemas.microsoft.com/office/drawing/2014/main" id="{2D47B889-990B-7744-B388-A04E8B719527}"/>
-              </a:ext>
-            </a:extLst>
-          </p:cNvPr>
-          <p:cNvPicPr>
-            <a:picLocks noGrp="1" noChangeAspect="1"/>
-          </p:cNvPicPr>
-          <p:nvPr>
-            <p:ph type="pic" sz="quarter" idx="14"/>
-          </p:nvPr>
-        </p:nvPicPr>
-        <p:blipFill>
-          <a:blip r:embed="rId5" cstate="screen">
-            <a:extLst>
-              <a:ext uri="{28A0092B-C50C-407E-A947-70E740481C1C}">
-                <a14:useLocalDpi xmlns:a14="http://schemas.microsoft.com/office/drawing/2010/main"/>
-              </a:ext>
-              <a:ext uri="{96DAC541-7B7A-43D3-8B79-37D633B846F1}">
-                <asvg:svgBlip xmlns:asvg="http://schemas.microsoft.com/office/drawing/2016/SVG/main" r:embed="rId6"/>
-              </a:ext>
-            </a:extLst>
-          </a:blip>
-          <a:srcRect/>
-          <a:stretch>
-            <a:fillRect/>
-          </a:stretch>
-        </p:blipFill>
-        <p:spPr/>
-      </p:pic>
-      <p:pic>
-        <p:nvPicPr>
-          <p:cNvPr id="95" name="Espaço Reservado para Imagem 94" descr="ícone&#10;">
-            <a:extLst>
-              <a:ext uri="{FF2B5EF4-FFF2-40B4-BE49-F238E27FC236}">
-                <a16:creationId xmlns:a16="http://schemas.microsoft.com/office/drawing/2014/main" id="{22846FFF-A603-9047-B91F-1BBE3D044E35}"/>
-              </a:ext>
-              <a:ext uri="{C183D7F6-B498-43B3-948B-1728B52AA6E4}">
-                <adec:decorative xmlns:adec="http://schemas.microsoft.com/office/drawing/2017/decorative" val="1"/>
-              </a:ext>
-            </a:extLst>
-          </p:cNvPr>
-          <p:cNvPicPr>
-            <a:picLocks noGrp="1" noChangeAspect="1"/>
-          </p:cNvPicPr>
-          <p:nvPr>
-            <p:ph type="pic" sz="quarter" idx="15"/>
-          </p:nvPr>
-        </p:nvPicPr>
-        <p:blipFill>
-          <a:blip r:embed="rId7" cstate="screen">
-            <a:extLst>
-              <a:ext uri="{28A0092B-C50C-407E-A947-70E740481C1C}">
-                <a14:useLocalDpi xmlns:a14="http://schemas.microsoft.com/office/drawing/2010/main"/>
-              </a:ext>
-              <a:ext uri="{96DAC541-7B7A-43D3-8B79-37D633B846F1}">
-                <asvg:svgBlip xmlns:asvg="http://schemas.microsoft.com/office/drawing/2016/SVG/main" r:embed="rId8"/>
-              </a:ext>
-            </a:extLst>
-          </a:blip>
-          <a:srcRect/>
-          <a:stretch>
-            <a:fillRect/>
-          </a:stretch>
-        </p:blipFill>
-        <p:spPr/>
-      </p:pic>
-      <p:pic>
-        <p:nvPicPr>
-          <p:cNvPr id="117" name="Espaço Reservado para Imagem 116" descr="ícone&#10;">
-            <a:extLst>
-              <a:ext uri="{FF2B5EF4-FFF2-40B4-BE49-F238E27FC236}">
-                <a16:creationId xmlns:a16="http://schemas.microsoft.com/office/drawing/2014/main" id="{9F6066D9-99C1-EA49-8232-E0CF4DFA9020}"/>
-              </a:ext>
-            </a:extLst>
-          </p:cNvPr>
-          <p:cNvPicPr>
-            <a:picLocks noGrp="1" noChangeAspect="1"/>
-          </p:cNvPicPr>
-          <p:nvPr>
-            <p:ph type="pic" sz="quarter" idx="21"/>
-          </p:nvPr>
-        </p:nvPicPr>
-        <p:blipFill>
-          <a:blip r:embed="rId9" cstate="screen">
-            <a:extLst>
-              <a:ext uri="{28A0092B-C50C-407E-A947-70E740481C1C}">
-                <a14:useLocalDpi xmlns:a14="http://schemas.microsoft.com/office/drawing/2010/main"/>
-              </a:ext>
-              <a:ext uri="{96DAC541-7B7A-43D3-8B79-37D633B846F1}">
-                <asvg:svgBlip xmlns:asvg="http://schemas.microsoft.com/office/drawing/2016/SVG/main" r:embed="rId10"/>
-              </a:ext>
-            </a:extLst>
-          </a:blip>
-          <a:srcRect t="427" b="427"/>
-          <a:stretch>
-            <a:fillRect/>
-          </a:stretch>
-        </p:blipFill>
-        <p:spPr/>
-      </p:pic>
-      <p:pic>
-        <p:nvPicPr>
-          <p:cNvPr id="119" name="Espaço Reservado para Imagem 118" descr="ícone&#10;">
-            <a:extLst>
-              <a:ext uri="{FF2B5EF4-FFF2-40B4-BE49-F238E27FC236}">
-                <a16:creationId xmlns:a16="http://schemas.microsoft.com/office/drawing/2014/main" id="{99C18B90-BB12-654C-AF46-B1098A1726C4}"/>
-              </a:ext>
-            </a:extLst>
-          </p:cNvPr>
-          <p:cNvPicPr>
-            <a:picLocks noGrp="1" noChangeAspect="1"/>
-          </p:cNvPicPr>
-          <p:nvPr>
-            <p:ph type="pic" sz="quarter" idx="22"/>
-          </p:nvPr>
-        </p:nvPicPr>
-        <p:blipFill>
-          <a:blip r:embed="rId11" cstate="screen">
-            <a:extLst>
-              <a:ext uri="{28A0092B-C50C-407E-A947-70E740481C1C}">
-                <a14:useLocalDpi xmlns:a14="http://schemas.microsoft.com/office/drawing/2010/main"/>
-              </a:ext>
-              <a:ext uri="{96DAC541-7B7A-43D3-8B79-37D633B846F1}">
-                <asvg:svgBlip xmlns:asvg="http://schemas.microsoft.com/office/drawing/2016/SVG/main" r:embed="rId12"/>
-              </a:ext>
-            </a:extLst>
-          </a:blip>
-          <a:srcRect t="427" b="427"/>
-          <a:stretch>
-            <a:fillRect/>
-          </a:stretch>
-        </p:blipFill>
-        <p:spPr/>
-      </p:pic>
-      <p:pic>
-        <p:nvPicPr>
-          <p:cNvPr id="121" name="Espaço Reservado para Imagem 120" descr="ícone&#10;">
-            <a:extLst>
-              <a:ext uri="{FF2B5EF4-FFF2-40B4-BE49-F238E27FC236}">
-                <a16:creationId xmlns:a16="http://schemas.microsoft.com/office/drawing/2014/main" id="{4159F782-00CB-DC43-A1FC-7C24663612D0}"/>
-              </a:ext>
-              <a:ext uri="{C183D7F6-B498-43B3-948B-1728B52AA6E4}">
-                <adec:decorative xmlns:adec="http://schemas.microsoft.com/office/drawing/2017/decorative" val="1"/>
-              </a:ext>
-            </a:extLst>
-          </p:cNvPr>
-          <p:cNvPicPr>
-            <a:picLocks noGrp="1" noChangeAspect="1"/>
-          </p:cNvPicPr>
-          <p:nvPr>
-            <p:ph type="pic" sz="quarter" idx="23"/>
-          </p:nvPr>
-        </p:nvPicPr>
-        <p:blipFill>
-          <a:blip r:embed="rId13" cstate="screen">
-            <a:extLst>
-              <a:ext uri="{28A0092B-C50C-407E-A947-70E740481C1C}">
-                <a14:useLocalDpi xmlns:a14="http://schemas.microsoft.com/office/drawing/2010/main"/>
-              </a:ext>
-              <a:ext uri="{96DAC541-7B7A-43D3-8B79-37D633B846F1}">
-                <asvg:svgBlip xmlns:asvg="http://schemas.microsoft.com/office/drawing/2016/SVG/main" r:embed="rId14"/>
-              </a:ext>
-            </a:extLst>
-          </a:blip>
-          <a:srcRect t="214" b="214"/>
-          <a:stretch>
-            <a:fillRect/>
-          </a:stretch>
-        </p:blipFill>
-        <p:spPr/>
-      </p:pic>
-      <p:sp>
-        <p:nvSpPr>
-          <p:cNvPr id="267" name="Espaço Reservado para Texto 266">
-            <a:extLst>
-              <a:ext uri="{FF2B5EF4-FFF2-40B4-BE49-F238E27FC236}">
-                <a16:creationId xmlns:a16="http://schemas.microsoft.com/office/drawing/2014/main" id="{A694244C-EAE8-E84A-9A3B-8D12C1A5479B}"/>
-              </a:ext>
-            </a:extLst>
-          </p:cNvPr>
-          <p:cNvSpPr>
-            <a:spLocks noGrp="1"/>
-          </p:cNvSpPr>
-          <p:nvPr>
-            <p:ph type="body" sz="quarter" idx="25"/>
-          </p:nvPr>
-        </p:nvSpPr>
-        <p:spPr/>
-        <p:txBody>
-          <a:bodyPr rtlCol="0"/>
-          <a:lstStyle/>
-          <a:p>
-            <a:pPr rtl="0"/>
-            <a:r>
-              <a:rPr lang="pt-BR" dirty="0" err="1"/>
-              <a:t>Lorem</a:t>
-            </a:r>
-            <a:r>
-              <a:rPr lang="pt-BR" dirty="0"/>
-              <a:t> ipsum </a:t>
-            </a:r>
-            <a:r>
-              <a:rPr lang="pt-BR" dirty="0" err="1"/>
-              <a:t>dolor</a:t>
-            </a:r>
-            <a:r>
-              <a:rPr lang="pt-BR" dirty="0"/>
-              <a:t> </a:t>
-            </a:r>
-            <a:r>
-              <a:rPr lang="pt-BR" dirty="0" err="1"/>
-              <a:t>sit</a:t>
-            </a:r>
-            <a:r>
-              <a:rPr lang="pt-BR" dirty="0"/>
-              <a:t> </a:t>
-            </a:r>
-            <a:r>
-              <a:rPr lang="pt-BR" dirty="0" err="1"/>
-              <a:t>amet</a:t>
-            </a:r>
-            <a:r>
-              <a:rPr lang="pt-BR" dirty="0"/>
-              <a:t> </a:t>
-            </a:r>
-            <a:r>
-              <a:rPr lang="pt-BR" dirty="0" err="1"/>
-              <a:t>consectetuer</a:t>
-            </a:r>
-            <a:r>
-              <a:rPr lang="pt-BR" dirty="0"/>
-              <a:t> </a:t>
-            </a:r>
-            <a:r>
-              <a:rPr lang="pt-BR" dirty="0" err="1"/>
-              <a:t>adipiscing</a:t>
-            </a:r>
-            <a:r>
-              <a:rPr lang="pt-BR" dirty="0"/>
-              <a:t> </a:t>
-            </a:r>
-            <a:r>
-              <a:rPr lang="pt-BR" dirty="0" err="1"/>
-              <a:t>elit</a:t>
-            </a:r>
-            <a:r>
-              <a:rPr lang="pt-BR" dirty="0"/>
-              <a:t>, </a:t>
-            </a:r>
-            <a:br>
-              <a:rPr lang="pt-BR" dirty="0"/>
-            </a:br>
-            <a:r>
-              <a:rPr lang="pt-BR" dirty="0" err="1"/>
-              <a:t>sed</a:t>
-            </a:r>
-            <a:r>
-              <a:rPr lang="pt-BR" dirty="0"/>
-              <a:t> </a:t>
-            </a:r>
-            <a:r>
-              <a:rPr lang="pt-BR" dirty="0" err="1"/>
-              <a:t>diam</a:t>
-            </a:r>
-            <a:r>
-              <a:rPr lang="pt-BR" dirty="0"/>
-              <a:t> </a:t>
-            </a:r>
-            <a:r>
-              <a:rPr lang="pt-BR" dirty="0" err="1"/>
-              <a:t>nonummy</a:t>
-            </a:r>
-            <a:r>
-              <a:rPr lang="pt-BR" dirty="0"/>
-              <a:t> </a:t>
-            </a:r>
-            <a:r>
-              <a:rPr lang="pt-BR" dirty="0" err="1"/>
-              <a:t>nibh</a:t>
-            </a:r>
-            <a:r>
-              <a:rPr lang="pt-BR" dirty="0"/>
-              <a:t> </a:t>
-            </a:r>
-            <a:r>
-              <a:rPr lang="pt-BR" dirty="0" err="1"/>
-              <a:t>euismod</a:t>
-            </a:r>
-            <a:endParaRPr lang="pt-BR" dirty="0"/>
-          </a:p>
-        </p:txBody>
-      </p:sp>
-      <p:sp>
-        <p:nvSpPr>
-          <p:cNvPr id="250" name="Espaço Reservado para Texto 249">
-            <a:extLst>
-              <a:ext uri="{FF2B5EF4-FFF2-40B4-BE49-F238E27FC236}">
-                <a16:creationId xmlns:a16="http://schemas.microsoft.com/office/drawing/2014/main" id="{2FC5F420-06C1-8C4F-9332-B0D58D4733C9}"/>
-              </a:ext>
-            </a:extLst>
-          </p:cNvPr>
-          <p:cNvSpPr>
-            <a:spLocks noGrp="1"/>
-          </p:cNvSpPr>
-          <p:nvPr>
-            <p:ph type="body" idx="26"/>
-          </p:nvPr>
-        </p:nvSpPr>
-        <p:spPr/>
-        <p:txBody>
-          <a:bodyPr rtlCol="0"/>
-          <a:lstStyle/>
-          <a:p>
-            <a:pPr rtl="0"/>
-            <a:r>
-              <a:rPr lang="pt-BR"/>
-              <a:t>Lorem ipsum dolor sit amet</a:t>
-            </a:r>
-          </a:p>
-        </p:txBody>
-      </p:sp>
-      <p:sp>
-        <p:nvSpPr>
-          <p:cNvPr id="293" name="Espaço Reservado para Texto 292">
-            <a:extLst>
-              <a:ext uri="{FF2B5EF4-FFF2-40B4-BE49-F238E27FC236}">
-                <a16:creationId xmlns:a16="http://schemas.microsoft.com/office/drawing/2014/main" id="{95FAB652-3154-9344-A0FB-A255D42D5CC0}"/>
-              </a:ext>
-            </a:extLst>
-          </p:cNvPr>
-          <p:cNvSpPr>
-            <a:spLocks noGrp="1"/>
-          </p:cNvSpPr>
-          <p:nvPr>
-            <p:ph type="body" sz="quarter" idx="27"/>
-          </p:nvPr>
-        </p:nvSpPr>
-        <p:spPr/>
-        <p:txBody>
-          <a:bodyPr rtlCol="0"/>
-          <a:lstStyle/>
-          <a:p>
-            <a:pPr rtl="0"/>
-            <a:r>
-              <a:rPr lang="pt-BR"/>
-              <a:t>Lorem ipsum dolor sit amet consectetuer adipiscing elit, </a:t>
-            </a:r>
-            <a:br>
-              <a:rPr lang="pt-BR"/>
-            </a:br>
-            <a:r>
-              <a:rPr lang="pt-BR"/>
-              <a:t>sed diam nonummy nibh euismod</a:t>
-            </a:r>
-          </a:p>
-        </p:txBody>
-      </p:sp>
-      <p:sp>
-        <p:nvSpPr>
-          <p:cNvPr id="294" name="Espaço Reservado para Texto 293">
-            <a:extLst>
-              <a:ext uri="{FF2B5EF4-FFF2-40B4-BE49-F238E27FC236}">
-                <a16:creationId xmlns:a16="http://schemas.microsoft.com/office/drawing/2014/main" id="{98606489-5891-5241-A48C-BB3725C75A3D}"/>
-              </a:ext>
-            </a:extLst>
-          </p:cNvPr>
-          <p:cNvSpPr>
-            <a:spLocks noGrp="1"/>
-          </p:cNvSpPr>
-          <p:nvPr>
-            <p:ph type="body" idx="28"/>
-          </p:nvPr>
-        </p:nvSpPr>
-        <p:spPr/>
-        <p:txBody>
-          <a:bodyPr rtlCol="0"/>
-          <a:lstStyle/>
-          <a:p>
-            <a:pPr rtl="0"/>
-            <a:r>
-              <a:rPr lang="pt-BR"/>
-              <a:t>Lorem ipsum dolor sit amet</a:t>
-            </a:r>
-          </a:p>
-        </p:txBody>
-      </p:sp>
-      <p:sp>
-        <p:nvSpPr>
-          <p:cNvPr id="295" name="Espaço Reservado para Texto 294">
-            <a:extLst>
-              <a:ext uri="{FF2B5EF4-FFF2-40B4-BE49-F238E27FC236}">
-                <a16:creationId xmlns:a16="http://schemas.microsoft.com/office/drawing/2014/main" id="{2A38F4C8-B925-E44A-8AEB-4EA4469EA6E1}"/>
-              </a:ext>
-            </a:extLst>
-          </p:cNvPr>
-          <p:cNvSpPr>
-            <a:spLocks noGrp="1"/>
-          </p:cNvSpPr>
-          <p:nvPr>
-            <p:ph type="body" sz="quarter" idx="29"/>
-          </p:nvPr>
-        </p:nvSpPr>
-        <p:spPr/>
-        <p:txBody>
-          <a:bodyPr rtlCol="0"/>
-          <a:lstStyle/>
-          <a:p>
-            <a:pPr rtl="0"/>
-            <a:r>
-              <a:rPr lang="pt-BR"/>
-              <a:t>Lorem ipsum dolor sit amet consectetuer adipiscing elit, </a:t>
-            </a:r>
-            <a:br>
-              <a:rPr lang="pt-BR"/>
-            </a:br>
-            <a:r>
-              <a:rPr lang="pt-BR"/>
-              <a:t>sed diam nonummy nibh euismod</a:t>
-            </a:r>
-          </a:p>
-        </p:txBody>
-      </p:sp>
-      <p:sp>
-        <p:nvSpPr>
-          <p:cNvPr id="296" name="Espaço Reservado para Texto 295">
-            <a:extLst>
-              <a:ext uri="{FF2B5EF4-FFF2-40B4-BE49-F238E27FC236}">
-                <a16:creationId xmlns:a16="http://schemas.microsoft.com/office/drawing/2014/main" id="{A085C71C-38D8-D24F-98A3-15D7868C8C19}"/>
-              </a:ext>
-            </a:extLst>
-          </p:cNvPr>
-          <p:cNvSpPr>
-            <a:spLocks noGrp="1"/>
-          </p:cNvSpPr>
-          <p:nvPr>
-            <p:ph type="body" idx="30"/>
-          </p:nvPr>
-        </p:nvSpPr>
-        <p:spPr/>
-        <p:txBody>
-          <a:bodyPr rtlCol="0"/>
-          <a:lstStyle/>
-          <a:p>
-            <a:pPr rtl="0"/>
-            <a:r>
-              <a:rPr lang="pt-BR" dirty="0" err="1"/>
-              <a:t>Lorem</a:t>
-            </a:r>
-            <a:r>
-              <a:rPr lang="pt-BR" dirty="0"/>
-              <a:t> ipsum </a:t>
-            </a:r>
-            <a:r>
-              <a:rPr lang="pt-BR" dirty="0" err="1"/>
-              <a:t>dolor</a:t>
-            </a:r>
-            <a:r>
-              <a:rPr lang="pt-BR" dirty="0"/>
-              <a:t> </a:t>
-            </a:r>
-            <a:r>
-              <a:rPr lang="pt-BR" dirty="0" err="1"/>
-              <a:t>sit</a:t>
-            </a:r>
-            <a:r>
-              <a:rPr lang="pt-BR" dirty="0"/>
-              <a:t> </a:t>
-            </a:r>
-            <a:r>
-              <a:rPr lang="pt-BR" dirty="0" err="1"/>
-              <a:t>amet</a:t>
-            </a:r>
-            <a:endParaRPr lang="pt-BR" dirty="0"/>
-          </a:p>
-        </p:txBody>
-      </p:sp>
-      <p:sp>
-        <p:nvSpPr>
-          <p:cNvPr id="299" name="Espaço Reservado para Texto 298">
-            <a:extLst>
-              <a:ext uri="{FF2B5EF4-FFF2-40B4-BE49-F238E27FC236}">
-                <a16:creationId xmlns:a16="http://schemas.microsoft.com/office/drawing/2014/main" id="{BA9886D9-B6B7-5D49-AEB9-AFC0BB9CD938}"/>
-              </a:ext>
-            </a:extLst>
-          </p:cNvPr>
-          <p:cNvSpPr>
-            <a:spLocks noGrp="1"/>
-          </p:cNvSpPr>
-          <p:nvPr>
-            <p:ph type="body" sz="quarter" idx="33"/>
-          </p:nvPr>
-        </p:nvSpPr>
-        <p:spPr/>
-        <p:txBody>
-          <a:bodyPr rtlCol="0"/>
-          <a:lstStyle/>
-          <a:p>
-            <a:pPr rtl="0"/>
-            <a:r>
-              <a:rPr lang="pt-BR" dirty="0" err="1"/>
-              <a:t>Lorem</a:t>
-            </a:r>
-            <a:r>
-              <a:rPr lang="pt-BR" dirty="0"/>
-              <a:t> ipsum </a:t>
-            </a:r>
-            <a:r>
-              <a:rPr lang="pt-BR" dirty="0" err="1"/>
-              <a:t>dolor</a:t>
-            </a:r>
-            <a:r>
-              <a:rPr lang="pt-BR" dirty="0"/>
-              <a:t> </a:t>
-            </a:r>
-            <a:r>
-              <a:rPr lang="pt-BR" dirty="0" err="1"/>
-              <a:t>sit</a:t>
-            </a:r>
-            <a:r>
-              <a:rPr lang="pt-BR" dirty="0"/>
-              <a:t> </a:t>
-            </a:r>
-            <a:r>
-              <a:rPr lang="pt-BR" dirty="0" err="1"/>
-              <a:t>amet</a:t>
-            </a:r>
-            <a:r>
-              <a:rPr lang="pt-BR" dirty="0"/>
-              <a:t> </a:t>
-            </a:r>
-            <a:r>
-              <a:rPr lang="pt-BR" dirty="0" err="1"/>
-              <a:t>consectetuer</a:t>
-            </a:r>
-            <a:r>
-              <a:rPr lang="pt-BR" dirty="0"/>
-              <a:t> </a:t>
-            </a:r>
-            <a:r>
-              <a:rPr lang="pt-BR" dirty="0" err="1"/>
-              <a:t>adipiscing</a:t>
-            </a:r>
-            <a:r>
-              <a:rPr lang="pt-BR" dirty="0"/>
-              <a:t> </a:t>
-            </a:r>
-            <a:r>
-              <a:rPr lang="pt-BR" dirty="0" err="1"/>
-              <a:t>elit</a:t>
-            </a:r>
-            <a:r>
-              <a:rPr lang="pt-BR" dirty="0"/>
-              <a:t>, </a:t>
-            </a:r>
-            <a:br>
-              <a:rPr lang="pt-BR" dirty="0"/>
-            </a:br>
-            <a:r>
-              <a:rPr lang="pt-BR" dirty="0" err="1"/>
-              <a:t>sed</a:t>
-            </a:r>
-            <a:r>
-              <a:rPr lang="pt-BR" dirty="0"/>
-              <a:t> </a:t>
-            </a:r>
-            <a:r>
-              <a:rPr lang="pt-BR" dirty="0" err="1"/>
-              <a:t>diam</a:t>
-            </a:r>
-            <a:r>
-              <a:rPr lang="pt-BR" dirty="0"/>
-              <a:t> </a:t>
-            </a:r>
-            <a:r>
-              <a:rPr lang="pt-BR" dirty="0" err="1"/>
-              <a:t>nonummy</a:t>
-            </a:r>
-            <a:r>
-              <a:rPr lang="pt-BR" dirty="0"/>
-              <a:t> </a:t>
-            </a:r>
-            <a:r>
-              <a:rPr lang="pt-BR" dirty="0" err="1"/>
-              <a:t>nibh</a:t>
-            </a:r>
-            <a:r>
-              <a:rPr lang="pt-BR" dirty="0"/>
-              <a:t> </a:t>
-            </a:r>
-            <a:r>
-              <a:rPr lang="pt-BR" dirty="0" err="1"/>
-              <a:t>euismod</a:t>
-            </a:r>
-            <a:endParaRPr lang="pt-BR" dirty="0"/>
-          </a:p>
-        </p:txBody>
-      </p:sp>
-      <p:sp>
-        <p:nvSpPr>
-          <p:cNvPr id="300" name="Espaço Reservado para Texto 299">
-            <a:extLst>
-              <a:ext uri="{FF2B5EF4-FFF2-40B4-BE49-F238E27FC236}">
-                <a16:creationId xmlns:a16="http://schemas.microsoft.com/office/drawing/2014/main" id="{6E3DA1E8-1071-DA4F-B15A-B8C4D04ED94B}"/>
-              </a:ext>
-            </a:extLst>
-          </p:cNvPr>
-          <p:cNvSpPr>
-            <a:spLocks noGrp="1"/>
-          </p:cNvSpPr>
-          <p:nvPr>
-            <p:ph type="body" idx="34"/>
-          </p:nvPr>
-        </p:nvSpPr>
-        <p:spPr/>
-        <p:txBody>
-          <a:bodyPr rtlCol="0"/>
-          <a:lstStyle/>
-          <a:p>
-            <a:pPr rtl="0"/>
-            <a:r>
-              <a:rPr lang="pt-BR"/>
-              <a:t>Lorem ipsum dolor sit amet</a:t>
-            </a:r>
-          </a:p>
-        </p:txBody>
-      </p:sp>
-      <p:sp>
-        <p:nvSpPr>
-          <p:cNvPr id="301" name="Espaço Reservado para Texto 300">
-            <a:extLst>
-              <a:ext uri="{FF2B5EF4-FFF2-40B4-BE49-F238E27FC236}">
-                <a16:creationId xmlns:a16="http://schemas.microsoft.com/office/drawing/2014/main" id="{5E5FEC2A-D114-234A-993E-D136899FE1EA}"/>
-              </a:ext>
-            </a:extLst>
-          </p:cNvPr>
-          <p:cNvSpPr>
-            <a:spLocks noGrp="1"/>
-          </p:cNvSpPr>
-          <p:nvPr>
-            <p:ph type="body" sz="quarter" idx="35"/>
-          </p:nvPr>
-        </p:nvSpPr>
-        <p:spPr/>
-        <p:txBody>
-          <a:bodyPr rtlCol="0"/>
-          <a:lstStyle/>
-          <a:p>
-            <a:pPr rtl="0"/>
-            <a:r>
-              <a:rPr lang="pt-BR"/>
-              <a:t>Lorem ipsum dolor sit amet consectetuer adipiscing elit, </a:t>
-            </a:r>
-            <a:br>
-              <a:rPr lang="pt-BR"/>
-            </a:br>
-            <a:r>
-              <a:rPr lang="pt-BR"/>
-              <a:t>sed diam nonummy nibh euismod</a:t>
-            </a:r>
-          </a:p>
-        </p:txBody>
-      </p:sp>
-      <p:sp>
-        <p:nvSpPr>
-          <p:cNvPr id="302" name="Espaço Reservado para Texto 301">
-            <a:extLst>
-              <a:ext uri="{FF2B5EF4-FFF2-40B4-BE49-F238E27FC236}">
-                <a16:creationId xmlns:a16="http://schemas.microsoft.com/office/drawing/2014/main" id="{54932BF7-A47E-994E-8D38-4B3A53B38E24}"/>
-              </a:ext>
-            </a:extLst>
-          </p:cNvPr>
-          <p:cNvSpPr>
-            <a:spLocks noGrp="1"/>
-          </p:cNvSpPr>
-          <p:nvPr>
-            <p:ph type="body" idx="36"/>
-          </p:nvPr>
-        </p:nvSpPr>
-        <p:spPr/>
-        <p:txBody>
-          <a:bodyPr rtlCol="0"/>
-          <a:lstStyle/>
-          <a:p>
-            <a:pPr rtl="0"/>
-            <a:r>
-              <a:rPr lang="pt-BR"/>
-              <a:t>Lorem ipsum dolor sit amet</a:t>
-            </a:r>
-          </a:p>
-        </p:txBody>
-      </p:sp>
-      <p:sp>
-        <p:nvSpPr>
-          <p:cNvPr id="303" name="Espaço Reservado para Texto 302">
-            <a:extLst>
-              <a:ext uri="{FF2B5EF4-FFF2-40B4-BE49-F238E27FC236}">
-                <a16:creationId xmlns:a16="http://schemas.microsoft.com/office/drawing/2014/main" id="{297E64BC-E4C5-384E-A885-311532A07874}"/>
-              </a:ext>
-            </a:extLst>
-          </p:cNvPr>
-          <p:cNvSpPr>
-            <a:spLocks noGrp="1"/>
-          </p:cNvSpPr>
-          <p:nvPr>
-            <p:ph type="body" sz="quarter" idx="37"/>
-          </p:nvPr>
-        </p:nvSpPr>
-        <p:spPr/>
-        <p:txBody>
-          <a:bodyPr rtlCol="0"/>
-          <a:lstStyle/>
-          <a:p>
-            <a:pPr rtl="0"/>
-            <a:r>
-              <a:rPr lang="pt-BR"/>
-              <a:t>Lorem ipsum dolor sit amet consectetuer adipiscing elit, </a:t>
-            </a:r>
-            <a:br>
-              <a:rPr lang="pt-BR"/>
-            </a:br>
-            <a:r>
-              <a:rPr lang="pt-BR"/>
-              <a:t>sed diam nonummy nibh euismod</a:t>
-            </a:r>
-          </a:p>
-        </p:txBody>
-      </p:sp>
-      <p:sp>
-        <p:nvSpPr>
-          <p:cNvPr id="304" name="Espaço Reservado para Texto 303">
-            <a:extLst>
-              <a:ext uri="{FF2B5EF4-FFF2-40B4-BE49-F238E27FC236}">
-                <a16:creationId xmlns:a16="http://schemas.microsoft.com/office/drawing/2014/main" id="{56A69270-6AB8-3E49-9D29-BF18A8EC0901}"/>
-              </a:ext>
-            </a:extLst>
-          </p:cNvPr>
-          <p:cNvSpPr>
-            <a:spLocks noGrp="1"/>
-          </p:cNvSpPr>
-          <p:nvPr>
-            <p:ph type="body" idx="38"/>
-          </p:nvPr>
-        </p:nvSpPr>
-        <p:spPr/>
-        <p:txBody>
-          <a:bodyPr rtlCol="0"/>
-          <a:lstStyle/>
-          <a:p>
-            <a:pPr rtl="0"/>
-            <a:r>
-              <a:rPr lang="pt-BR"/>
-              <a:t>Lorem ipsum dolor sit amet</a:t>
-            </a:r>
-          </a:p>
-        </p:txBody>
-      </p:sp>
-    </p:spTree>
-    <p:extLst>
-      <p:ext uri="{BB962C8B-B14F-4D97-AF65-F5344CB8AC3E}">
-        <p14:creationId xmlns:p14="http://schemas.microsoft.com/office/powerpoint/2010/main" val="1594659803"/>
       </p:ext>
     </p:extLst>
   </p:cSld>

</xml_diff>